<commit_message>
small updates to lecture 3
</commit_message>
<xml_diff>
--- a/classes/stats2017/Lecture03.pptx
+++ b/classes/stats2017/Lecture03.pptx
@@ -257,7 +257,7 @@
             <a:fld id="{70778D97-C3FD-45B9-9D4E-C62E122BCE58}" type="datetimeFigureOut">
               <a:rPr lang="en-US" smtClean="0"/>
               <a:pPr/>
-              <a:t>1/15/2017</a:t>
+              <a:t>1/19/2017</a:t>
             </a:fld>
             <a:endParaRPr lang="en-US"/>
           </a:p>
@@ -2914,7 +2914,7 @@
             <a:fld id="{1D8BD707-D9CF-40AE-B4C6-C98DA3205C09}" type="datetimeFigureOut">
               <a:rPr lang="en-US" smtClean="0"/>
               <a:pPr/>
-              <a:t>1/15/2017</a:t>
+              <a:t>1/19/2017</a:t>
             </a:fld>
             <a:endParaRPr lang="en-US"/>
           </a:p>
@@ -3079,7 +3079,7 @@
             <a:fld id="{1D8BD707-D9CF-40AE-B4C6-C98DA3205C09}" type="datetimeFigureOut">
               <a:rPr lang="en-US" smtClean="0"/>
               <a:pPr/>
-              <a:t>1/15/2017</a:t>
+              <a:t>1/19/2017</a:t>
             </a:fld>
             <a:endParaRPr lang="en-US"/>
           </a:p>
@@ -3254,7 +3254,7 @@
             <a:fld id="{1D8BD707-D9CF-40AE-B4C6-C98DA3205C09}" type="datetimeFigureOut">
               <a:rPr lang="en-US" smtClean="0"/>
               <a:pPr/>
-              <a:t>1/15/2017</a:t>
+              <a:t>1/19/2017</a:t>
             </a:fld>
             <a:endParaRPr lang="en-US"/>
           </a:p>
@@ -3419,7 +3419,7 @@
             <a:fld id="{1D8BD707-D9CF-40AE-B4C6-C98DA3205C09}" type="datetimeFigureOut">
               <a:rPr lang="en-US" smtClean="0"/>
               <a:pPr/>
-              <a:t>1/15/2017</a:t>
+              <a:t>1/19/2017</a:t>
             </a:fld>
             <a:endParaRPr lang="en-US"/>
           </a:p>
@@ -3661,7 +3661,7 @@
             <a:fld id="{1D8BD707-D9CF-40AE-B4C6-C98DA3205C09}" type="datetimeFigureOut">
               <a:rPr lang="en-US" smtClean="0"/>
               <a:pPr/>
-              <a:t>1/15/2017</a:t>
+              <a:t>1/19/2017</a:t>
             </a:fld>
             <a:endParaRPr lang="en-US"/>
           </a:p>
@@ -3943,7 +3943,7 @@
             <a:fld id="{1D8BD707-D9CF-40AE-B4C6-C98DA3205C09}" type="datetimeFigureOut">
               <a:rPr lang="en-US" smtClean="0"/>
               <a:pPr/>
-              <a:t>1/15/2017</a:t>
+              <a:t>1/19/2017</a:t>
             </a:fld>
             <a:endParaRPr lang="en-US"/>
           </a:p>
@@ -4359,7 +4359,7 @@
             <a:fld id="{1D8BD707-D9CF-40AE-B4C6-C98DA3205C09}" type="datetimeFigureOut">
               <a:rPr lang="en-US" smtClean="0"/>
               <a:pPr/>
-              <a:t>1/15/2017</a:t>
+              <a:t>1/19/2017</a:t>
             </a:fld>
             <a:endParaRPr lang="en-US"/>
           </a:p>
@@ -4473,7 +4473,7 @@
             <a:fld id="{1D8BD707-D9CF-40AE-B4C6-C98DA3205C09}" type="datetimeFigureOut">
               <a:rPr lang="en-US" smtClean="0"/>
               <a:pPr/>
-              <a:t>1/15/2017</a:t>
+              <a:t>1/19/2017</a:t>
             </a:fld>
             <a:endParaRPr lang="en-US"/>
           </a:p>
@@ -4565,7 +4565,7 @@
             <a:fld id="{1D8BD707-D9CF-40AE-B4C6-C98DA3205C09}" type="datetimeFigureOut">
               <a:rPr lang="en-US" smtClean="0"/>
               <a:pPr/>
-              <a:t>1/15/2017</a:t>
+              <a:t>1/19/2017</a:t>
             </a:fld>
             <a:endParaRPr lang="en-US"/>
           </a:p>
@@ -4837,7 +4837,7 @@
             <a:fld id="{1D8BD707-D9CF-40AE-B4C6-C98DA3205C09}" type="datetimeFigureOut">
               <a:rPr lang="en-US" smtClean="0"/>
               <a:pPr/>
-              <a:t>1/15/2017</a:t>
+              <a:t>1/19/2017</a:t>
             </a:fld>
             <a:endParaRPr lang="en-US"/>
           </a:p>
@@ -5086,7 +5086,7 @@
             <a:fld id="{1D8BD707-D9CF-40AE-B4C6-C98DA3205C09}" type="datetimeFigureOut">
               <a:rPr lang="en-US" smtClean="0"/>
               <a:pPr/>
-              <a:t>1/15/2017</a:t>
+              <a:t>1/19/2017</a:t>
             </a:fld>
             <a:endParaRPr lang="en-US"/>
           </a:p>
@@ -5294,7 +5294,7 @@
             <a:fld id="{1D8BD707-D9CF-40AE-B4C6-C98DA3205C09}" type="datetimeFigureOut">
               <a:rPr lang="en-US" smtClean="0"/>
               <a:pPr/>
-              <a:t>1/15/2017</a:t>
+              <a:t>1/19/2017</a:t>
             </a:fld>
             <a:endParaRPr lang="en-US"/>
           </a:p>
@@ -11827,7 +11827,7 @@
           <a:graphicData uri="http://schemas.openxmlformats.org/presentationml/2006/ole">
             <mc:AlternateContent xmlns:mc="http://schemas.openxmlformats.org/markup-compatibility/2006">
               <mc:Choice xmlns:v="urn:schemas-microsoft-com:vml" Requires="v">
-                <p:oleObj spid="_x0000_s133144" name="Bitmap Image" r:id="rId4" imgW="9771429" imgH="6973273" progId="PBrush">
+                <p:oleObj spid="_x0000_s133148" name="Bitmap Image" r:id="rId4" imgW="9771429" imgH="6973273" progId="PBrush">
                   <p:embed/>
                 </p:oleObj>
               </mc:Choice>
@@ -11992,7 +11992,7 @@
           <a:graphicData uri="http://schemas.openxmlformats.org/presentationml/2006/ole">
             <mc:AlternateContent xmlns:mc="http://schemas.openxmlformats.org/markup-compatibility/2006">
               <mc:Choice xmlns:v="urn:schemas-microsoft-com:vml" Requires="v">
-                <p:oleObj spid="_x0000_s134168" name="Bitmap Image" r:id="rId4" imgW="7857143" imgH="4667902" progId="PBrush">
+                <p:oleObj spid="_x0000_s134172" name="Bitmap Image" r:id="rId4" imgW="7857143" imgH="4667902" progId="PBrush">
                   <p:embed/>
                 </p:oleObj>
               </mc:Choice>
@@ -12162,7 +12162,7 @@
           <a:graphicData uri="http://schemas.openxmlformats.org/presentationml/2006/ole">
             <mc:AlternateContent xmlns:mc="http://schemas.openxmlformats.org/markup-compatibility/2006">
               <mc:Choice xmlns:v="urn:schemas-microsoft-com:vml" Requires="v">
-                <p:oleObj spid="_x0000_s135192" name="Bitmap Image" r:id="rId4" imgW="8411749" imgH="1752381" progId="PBrush">
+                <p:oleObj spid="_x0000_s135196" name="Bitmap Image" r:id="rId4" imgW="8411749" imgH="1752381" progId="PBrush">
                   <p:embed/>
                 </p:oleObj>
               </mc:Choice>
@@ -14126,7 +14126,7 @@
           <a:graphicData uri="http://schemas.openxmlformats.org/presentationml/2006/ole">
             <mc:AlternateContent xmlns:mc="http://schemas.openxmlformats.org/markup-compatibility/2006">
               <mc:Choice xmlns:v="urn:schemas-microsoft-com:vml" Requires="v">
-                <p:oleObj spid="_x0000_s136216" name="Bitmap Image" r:id="rId4" imgW="7516274" imgH="2933333" progId="PBrush">
+                <p:oleObj spid="_x0000_s136220" name="Bitmap Image" r:id="rId4" imgW="7516274" imgH="2933333" progId="PBrush">
                   <p:embed/>
                 </p:oleObj>
               </mc:Choice>
@@ -14847,7 +14847,7 @@
           <a:graphicData uri="http://schemas.openxmlformats.org/presentationml/2006/ole">
             <mc:AlternateContent xmlns:mc="http://schemas.openxmlformats.org/markup-compatibility/2006">
               <mc:Choice xmlns:v="urn:schemas-microsoft-com:vml" Requires="v">
-                <p:oleObj spid="_x0000_s137240" name="Bitmap Image" r:id="rId4" imgW="9888330" imgH="6838095" progId="PBrush">
+                <p:oleObj spid="_x0000_s137244" name="Bitmap Image" r:id="rId4" imgW="9888330" imgH="6838095" progId="PBrush">
                   <p:embed/>
                 </p:oleObj>
               </mc:Choice>
@@ -18309,7 +18309,7 @@
           <a:graphicData uri="http://schemas.openxmlformats.org/presentationml/2006/ole">
             <mc:AlternateContent xmlns:mc="http://schemas.openxmlformats.org/markup-compatibility/2006">
               <mc:Choice xmlns:v="urn:schemas-microsoft-com:vml" Requires="v">
-                <p:oleObj spid="_x0000_s138264" name="Bitmap Image" r:id="rId4" imgW="5877745" imgH="2123810" progId="PBrush">
+                <p:oleObj spid="_x0000_s138268" name="Bitmap Image" r:id="rId4" imgW="5877745" imgH="2123810" progId="PBrush">
                   <p:embed/>
                 </p:oleObj>
               </mc:Choice>
@@ -18809,7 +18809,7 @@
           <a:graphicData uri="http://schemas.openxmlformats.org/presentationml/2006/ole">
             <mc:AlternateContent xmlns:mc="http://schemas.openxmlformats.org/markup-compatibility/2006">
               <mc:Choice xmlns:v="urn:schemas-microsoft-com:vml" Requires="v">
-                <p:oleObj spid="_x0000_s139288" name="Bitmap Image" r:id="rId4" imgW="7923810" imgH="5304762" progId="PBrush">
+                <p:oleObj spid="_x0000_s139292" name="Bitmap Image" r:id="rId4" imgW="7923810" imgH="5304762" progId="PBrush">
                   <p:embed/>
                 </p:oleObj>
               </mc:Choice>
@@ -19329,7 +19329,7 @@
           <a:graphicData uri="http://schemas.openxmlformats.org/presentationml/2006/ole">
             <mc:AlternateContent xmlns:mc="http://schemas.openxmlformats.org/markup-compatibility/2006">
               <mc:Choice xmlns:v="urn:schemas-microsoft-com:vml" Requires="v">
-                <p:oleObj spid="_x0000_s140334" name="Bitmap Image" r:id="rId4" imgW="5742857" imgH="1914286" progId="PBrush">
+                <p:oleObj spid="_x0000_s140342" name="Bitmap Image" r:id="rId4" imgW="5742857" imgH="1914286" progId="PBrush">
                   <p:embed/>
                 </p:oleObj>
               </mc:Choice>
@@ -19422,7 +19422,7 @@
           <a:graphicData uri="http://schemas.openxmlformats.org/presentationml/2006/ole">
             <mc:AlternateContent xmlns:mc="http://schemas.openxmlformats.org/markup-compatibility/2006">
               <mc:Choice xmlns:v="urn:schemas-microsoft-com:vml" Requires="v">
-                <p:oleObj spid="_x0000_s140335" name="Bitmap Image" r:id="rId6" imgW="5904762" imgH="1914286" progId="PBrush">
+                <p:oleObj spid="_x0000_s140343" name="Bitmap Image" r:id="rId6" imgW="5904762" imgH="1914286" progId="PBrush">
                   <p:embed/>
                 </p:oleObj>
               </mc:Choice>
@@ -19965,6 +19965,41 @@
           </a:prstGeom>
         </p:spPr>
       </p:pic>
+      <p:sp>
+        <p:nvSpPr>
+          <p:cNvPr id="4" name="TextBox 3"/>
+          <p:cNvSpPr txBox="1"/>
+          <p:nvPr/>
+        </p:nvSpPr>
+        <p:spPr>
+          <a:xfrm>
+            <a:off x="457200" y="5715000"/>
+            <a:ext cx="4632230" cy="646331"/>
+          </a:xfrm>
+          <a:prstGeom prst="rect">
+            <a:avLst/>
+          </a:prstGeom>
+          <a:noFill/>
+        </p:spPr>
+        <p:txBody>
+          <a:bodyPr wrap="none" rtlCol="0">
+            <a:spAutoFit/>
+          </a:bodyPr>
+          <a:lstStyle/>
+          <a:p>
+            <a:r>
+              <a:rPr lang="en-US" dirty="0"/>
+              <a:t>If I flip a coin with p(head) =0.75, what fraction </a:t>
+            </a:r>
+          </a:p>
+          <a:p>
+            <a:r>
+              <a:rPr lang="en-US" dirty="0"/>
+              <a:t>of the time will I see 682 heads or fewer?</a:t>
+            </a:r>
+          </a:p>
+        </p:txBody>
+      </p:sp>
     </p:spTree>
   </p:cSld>
   <p:clrMapOvr>
@@ -20311,6 +20346,229 @@
           <a:chExt cx="0" cy="0"/>
         </a:xfrm>
       </p:grpSpPr>
+      <p:sp>
+        <p:nvSpPr>
+          <p:cNvPr id="5" name="TextBox 4"/>
+          <p:cNvSpPr txBox="1"/>
+          <p:nvPr/>
+        </p:nvSpPr>
+        <p:spPr>
+          <a:xfrm>
+            <a:off x="0" y="304800"/>
+            <a:ext cx="3810000" cy="3139321"/>
+          </a:xfrm>
+          <a:prstGeom prst="rect">
+            <a:avLst/>
+          </a:prstGeom>
+          <a:noFill/>
+        </p:spPr>
+        <p:txBody>
+          <a:bodyPr wrap="square" rtlCol="0">
+            <a:spAutoFit/>
+          </a:bodyPr>
+          <a:lstStyle/>
+          <a:p>
+            <a:r>
+              <a:rPr lang="en-US" dirty="0"/>
+              <a:t>Algorithm for 2 sided test:</a:t>
+            </a:r>
+          </a:p>
+          <a:p>
+            <a:endParaRPr lang="en-US" dirty="0"/>
+          </a:p>
+          <a:p>
+            <a:pPr marL="342900" indent="-342900">
+              <a:buAutoNum type="arabicParenBoth"/>
+            </a:pPr>
+            <a:r>
+              <a:rPr lang="en-US" dirty="0"/>
+              <a:t>Sum the probability from 0 to 682</a:t>
+            </a:r>
+          </a:p>
+          <a:p>
+            <a:pPr marL="342900" indent="-342900">
+              <a:buAutoNum type="arabicParenBoth"/>
+            </a:pPr>
+            <a:endParaRPr lang="en-US" dirty="0"/>
+          </a:p>
+          <a:p>
+            <a:pPr marL="342900" indent="-342900">
+              <a:buAutoNum type="arabicParenBoth"/>
+            </a:pPr>
+            <a:r>
+              <a:rPr lang="en-US" dirty="0"/>
+              <a:t>Find the area on the right</a:t>
+            </a:r>
+          </a:p>
+          <a:p>
+            <a:pPr marL="342900" indent="-342900"/>
+            <a:r>
+              <a:rPr lang="en-US" dirty="0"/>
+              <a:t>hand side corresponding to</a:t>
+            </a:r>
+          </a:p>
+          <a:p>
+            <a:pPr marL="342900" indent="-342900"/>
+            <a:r>
+              <a:rPr lang="en-US" dirty="0"/>
+              <a:t>the height of </a:t>
+            </a:r>
+            <a:r>
+              <a:rPr lang="en-US" dirty="0" err="1"/>
+              <a:t>dbinom</a:t>
+            </a:r>
+            <a:r>
+              <a:rPr lang="en-US" dirty="0"/>
+              <a:t>(682,965,0.75)</a:t>
+            </a:r>
+          </a:p>
+          <a:p>
+            <a:pPr marL="342900" indent="-342900"/>
+            <a:endParaRPr lang="en-US" dirty="0"/>
+          </a:p>
+          <a:p>
+            <a:pPr marL="342900" indent="-342900"/>
+            <a:r>
+              <a:rPr lang="en-US" dirty="0"/>
+              <a:t>(3) Add the area on the right.</a:t>
+            </a:r>
+          </a:p>
+          <a:p>
+            <a:endParaRPr lang="en-US" dirty="0"/>
+          </a:p>
+          <a:p>
+            <a:endParaRPr lang="en-US" dirty="0"/>
+          </a:p>
+        </p:txBody>
+      </p:sp>
+      <p:sp>
+        <p:nvSpPr>
+          <p:cNvPr id="16" name="TextBox 15"/>
+          <p:cNvSpPr txBox="1"/>
+          <p:nvPr/>
+        </p:nvSpPr>
+        <p:spPr>
+          <a:xfrm>
+            <a:off x="228600" y="2819400"/>
+            <a:ext cx="3099823" cy="1200329"/>
+          </a:xfrm>
+          <a:prstGeom prst="rect">
+            <a:avLst/>
+          </a:prstGeom>
+          <a:noFill/>
+        </p:spPr>
+        <p:txBody>
+          <a:bodyPr wrap="none" rtlCol="0">
+            <a:spAutoFit/>
+          </a:bodyPr>
+          <a:lstStyle/>
+          <a:p>
+            <a:r>
+              <a:rPr lang="en-US" dirty="0"/>
+              <a:t>Our p-values is </a:t>
+            </a:r>
+          </a:p>
+          <a:p>
+            <a:r>
+              <a:rPr lang="en-US" dirty="0" err="1"/>
+              <a:t>pbinom</a:t>
+            </a:r>
+            <a:r>
+              <a:rPr lang="en-US" dirty="0"/>
+              <a:t>(0,682,0.75) + </a:t>
+            </a:r>
+          </a:p>
+          <a:p>
+            <a:r>
+              <a:rPr lang="en-US" dirty="0"/>
+              <a:t>everything from the equivalent</a:t>
+            </a:r>
+          </a:p>
+          <a:p>
+            <a:r>
+              <a:rPr lang="en-US" dirty="0"/>
+              <a:t>point on the right…</a:t>
+            </a:r>
+          </a:p>
+        </p:txBody>
+      </p:sp>
+      <p:sp>
+        <p:nvSpPr>
+          <p:cNvPr id="11" name="TextBox 10"/>
+          <p:cNvSpPr txBox="1"/>
+          <p:nvPr/>
+        </p:nvSpPr>
+        <p:spPr>
+          <a:xfrm>
+            <a:off x="92138" y="0"/>
+            <a:ext cx="8975662" cy="369332"/>
+          </a:xfrm>
+          <a:prstGeom prst="rect">
+            <a:avLst/>
+          </a:prstGeom>
+          <a:noFill/>
+        </p:spPr>
+        <p:txBody>
+          <a:bodyPr wrap="none" rtlCol="0">
+            <a:spAutoFit/>
+          </a:bodyPr>
+          <a:lstStyle/>
+          <a:p>
+            <a:r>
+              <a:rPr lang="en-US" dirty="0"/>
+              <a:t>It turns out that </a:t>
+            </a:r>
+            <a:r>
+              <a:rPr lang="en-US" dirty="0" err="1"/>
+              <a:t>binom.test</a:t>
+            </a:r>
+            <a:r>
+              <a:rPr lang="en-US" dirty="0"/>
+              <a:t> is written in R, so we can get to code easily..(type </a:t>
+            </a:r>
+            <a:r>
+              <a:rPr lang="en-US" dirty="0" err="1"/>
+              <a:t>binom.test</a:t>
+            </a:r>
+            <a:r>
+              <a:rPr lang="en-US" dirty="0"/>
+              <a:t> in R )</a:t>
+            </a:r>
+          </a:p>
+        </p:txBody>
+      </p:sp>
+      <p:sp>
+        <p:nvSpPr>
+          <p:cNvPr id="2" name="TextBox 1"/>
+          <p:cNvSpPr txBox="1"/>
+          <p:nvPr/>
+        </p:nvSpPr>
+        <p:spPr>
+          <a:xfrm>
+            <a:off x="228600" y="3982998"/>
+            <a:ext cx="3220112" cy="646331"/>
+          </a:xfrm>
+          <a:prstGeom prst="rect">
+            <a:avLst/>
+          </a:prstGeom>
+          <a:noFill/>
+        </p:spPr>
+        <p:txBody>
+          <a:bodyPr wrap="none" rtlCol="0">
+            <a:spAutoFit/>
+          </a:bodyPr>
+          <a:lstStyle/>
+          <a:p>
+            <a:r>
+              <a:rPr lang="en-US" dirty="0"/>
+              <a:t>This number turns out to be 705</a:t>
+            </a:r>
+          </a:p>
+          <a:p>
+            <a:endParaRPr lang="en-US" dirty="0"/>
+          </a:p>
+        </p:txBody>
+      </p:sp>
       <p:pic>
         <p:nvPicPr>
           <p:cNvPr id="13" name="Picture 12"/>
@@ -20327,8 +20585,8 @@
         </p:blipFill>
         <p:spPr>
           <a:xfrm>
-            <a:off x="76200" y="4343400"/>
-            <a:ext cx="4584649" cy="2134106"/>
+            <a:off x="211649" y="4419600"/>
+            <a:ext cx="4951349" cy="2304801"/>
           </a:xfrm>
           <a:prstGeom prst="rect">
             <a:avLst/>
@@ -20337,419 +20595,28 @@
       </p:pic>
       <p:pic>
         <p:nvPicPr>
-          <p:cNvPr id="56322" name="Picture 2"/>
+          <p:cNvPr id="6" name="Picture 5"/>
           <p:cNvPicPr>
-            <a:picLocks noChangeAspect="1" noChangeArrowheads="1"/>
+            <a:picLocks noChangeAspect="1"/>
           </p:cNvPicPr>
           <p:nvPr/>
         </p:nvPicPr>
         <p:blipFill>
-          <a:blip r:embed="rId3" cstate="print"/>
-          <a:srcRect/>
+          <a:blip r:embed="rId3"/>
           <a:stretch>
             <a:fillRect/>
           </a:stretch>
         </p:blipFill>
-        <p:spPr bwMode="auto">
-          <a:xfrm>
-            <a:off x="3572537" y="164068"/>
-            <a:ext cx="5448300" cy="5448300"/>
-          </a:xfrm>
-          <a:prstGeom prst="rect">
-            <a:avLst/>
-          </a:prstGeom>
-          <a:noFill/>
-          <a:ln w="9525">
-            <a:noFill/>
-            <a:miter lim="800000"/>
-            <a:headEnd/>
-            <a:tailEnd/>
-          </a:ln>
+        <p:spPr>
+          <a:xfrm>
+            <a:off x="3954974" y="536992"/>
+            <a:ext cx="4967852" cy="4564816"/>
+          </a:xfrm>
+          <a:prstGeom prst="rect">
+            <a:avLst/>
+          </a:prstGeom>
         </p:spPr>
       </p:pic>
-      <p:sp>
-        <p:nvSpPr>
-          <p:cNvPr id="10" name="TextBox 9"/>
-          <p:cNvSpPr txBox="1"/>
-          <p:nvPr/>
-        </p:nvSpPr>
-        <p:spPr>
-          <a:xfrm>
-            <a:off x="6172200" y="3429000"/>
-            <a:ext cx="535724" cy="369332"/>
-          </a:xfrm>
-          <a:prstGeom prst="rect">
-            <a:avLst/>
-          </a:prstGeom>
-          <a:noFill/>
-        </p:spPr>
-        <p:txBody>
-          <a:bodyPr wrap="none" rtlCol="0">
-            <a:spAutoFit/>
-          </a:bodyPr>
-          <a:lstStyle/>
-          <a:p>
-            <a:r>
-              <a:rPr lang="en-US" dirty="0"/>
-              <a:t>682</a:t>
-            </a:r>
-          </a:p>
-        </p:txBody>
-      </p:sp>
-      <p:sp>
-        <p:nvSpPr>
-          <p:cNvPr id="5" name="TextBox 4"/>
-          <p:cNvSpPr txBox="1"/>
-          <p:nvPr/>
-        </p:nvSpPr>
-        <p:spPr>
-          <a:xfrm>
-            <a:off x="0" y="381000"/>
-            <a:ext cx="3810000" cy="3139321"/>
-          </a:xfrm>
-          <a:prstGeom prst="rect">
-            <a:avLst/>
-          </a:prstGeom>
-          <a:noFill/>
-        </p:spPr>
-        <p:txBody>
-          <a:bodyPr wrap="square" rtlCol="0">
-            <a:spAutoFit/>
-          </a:bodyPr>
-          <a:lstStyle/>
-          <a:p>
-            <a:r>
-              <a:rPr lang="en-US" dirty="0"/>
-              <a:t>Algorithm for 2 sided test:</a:t>
-            </a:r>
-          </a:p>
-          <a:p>
-            <a:endParaRPr lang="en-US" dirty="0"/>
-          </a:p>
-          <a:p>
-            <a:pPr marL="342900" indent="-342900">
-              <a:buAutoNum type="arabicParenBoth"/>
-            </a:pPr>
-            <a:r>
-              <a:rPr lang="en-US" dirty="0"/>
-              <a:t>Sum the probability from 0 to 682</a:t>
-            </a:r>
-          </a:p>
-          <a:p>
-            <a:pPr marL="342900" indent="-342900">
-              <a:buAutoNum type="arabicParenBoth"/>
-            </a:pPr>
-            <a:endParaRPr lang="en-US" dirty="0"/>
-          </a:p>
-          <a:p>
-            <a:pPr marL="342900" indent="-342900">
-              <a:buAutoNum type="arabicParenBoth"/>
-            </a:pPr>
-            <a:r>
-              <a:rPr lang="en-US" dirty="0"/>
-              <a:t>Find the area on the right</a:t>
-            </a:r>
-          </a:p>
-          <a:p>
-            <a:pPr marL="342900" indent="-342900"/>
-            <a:r>
-              <a:rPr lang="en-US" dirty="0"/>
-              <a:t>hand side corresponding to</a:t>
-            </a:r>
-          </a:p>
-          <a:p>
-            <a:pPr marL="342900" indent="-342900"/>
-            <a:r>
-              <a:rPr lang="en-US" dirty="0"/>
-              <a:t>the height of </a:t>
-            </a:r>
-            <a:r>
-              <a:rPr lang="en-US" dirty="0" err="1"/>
-              <a:t>dbinom</a:t>
-            </a:r>
-            <a:r>
-              <a:rPr lang="en-US" dirty="0"/>
-              <a:t>(682,965,0.75)</a:t>
-            </a:r>
-          </a:p>
-          <a:p>
-            <a:pPr marL="342900" indent="-342900"/>
-            <a:endParaRPr lang="en-US" dirty="0"/>
-          </a:p>
-          <a:p>
-            <a:pPr marL="342900" indent="-342900"/>
-            <a:r>
-              <a:rPr lang="en-US" dirty="0"/>
-              <a:t>(3) Add the area on the right.</a:t>
-            </a:r>
-          </a:p>
-          <a:p>
-            <a:endParaRPr lang="en-US" dirty="0"/>
-          </a:p>
-          <a:p>
-            <a:endParaRPr lang="en-US" dirty="0"/>
-          </a:p>
-        </p:txBody>
-      </p:sp>
-      <p:cxnSp>
-        <p:nvCxnSpPr>
-          <p:cNvPr id="9" name="Straight Arrow Connector 8"/>
-          <p:cNvCxnSpPr/>
-          <p:nvPr/>
-        </p:nvCxnSpPr>
-        <p:spPr>
-          <a:xfrm>
-            <a:off x="6781800" y="3657600"/>
-            <a:ext cx="228600" cy="152400"/>
-          </a:xfrm>
-          <a:prstGeom prst="straightConnector1">
-            <a:avLst/>
-          </a:prstGeom>
-          <a:ln>
-            <a:tailEnd type="arrow"/>
-          </a:ln>
-        </p:spPr>
-        <p:style>
-          <a:lnRef idx="1">
-            <a:schemeClr val="accent1"/>
-          </a:lnRef>
-          <a:fillRef idx="0">
-            <a:schemeClr val="accent1"/>
-          </a:fillRef>
-          <a:effectRef idx="0">
-            <a:schemeClr val="accent1"/>
-          </a:effectRef>
-          <a:fontRef idx="minor">
-            <a:schemeClr val="tx1"/>
-          </a:fontRef>
-        </p:style>
-      </p:cxnSp>
-      <p:cxnSp>
-        <p:nvCxnSpPr>
-          <p:cNvPr id="12" name="Straight Connector 11"/>
-          <p:cNvCxnSpPr/>
-          <p:nvPr/>
-        </p:nvCxnSpPr>
-        <p:spPr>
-          <a:xfrm>
-            <a:off x="6934200" y="3810000"/>
-            <a:ext cx="990600" cy="0"/>
-          </a:xfrm>
-          <a:prstGeom prst="line">
-            <a:avLst/>
-          </a:prstGeom>
-        </p:spPr>
-        <p:style>
-          <a:lnRef idx="1">
-            <a:schemeClr val="accent1"/>
-          </a:lnRef>
-          <a:fillRef idx="0">
-            <a:schemeClr val="accent1"/>
-          </a:fillRef>
-          <a:effectRef idx="0">
-            <a:schemeClr val="accent1"/>
-          </a:effectRef>
-          <a:fontRef idx="minor">
-            <a:schemeClr val="tx1"/>
-          </a:fontRef>
-        </p:style>
-      </p:cxnSp>
-      <p:sp>
-        <p:nvSpPr>
-          <p:cNvPr id="15" name="TextBox 14"/>
-          <p:cNvSpPr txBox="1"/>
-          <p:nvPr/>
-        </p:nvSpPr>
-        <p:spPr>
-          <a:xfrm>
-            <a:off x="7772292" y="3048000"/>
-            <a:ext cx="1219308" cy="646331"/>
-          </a:xfrm>
-          <a:prstGeom prst="rect">
-            <a:avLst/>
-          </a:prstGeom>
-          <a:noFill/>
-        </p:spPr>
-        <p:txBody>
-          <a:bodyPr wrap="none" rtlCol="0">
-            <a:spAutoFit/>
-          </a:bodyPr>
-          <a:lstStyle/>
-          <a:p>
-            <a:r>
-              <a:rPr lang="en-US" dirty="0"/>
-              <a:t>Equivalent </a:t>
-            </a:r>
-          </a:p>
-          <a:p>
-            <a:r>
-              <a:rPr lang="en-US" dirty="0"/>
-              <a:t>on right</a:t>
-            </a:r>
-          </a:p>
-        </p:txBody>
-      </p:sp>
-      <p:sp>
-        <p:nvSpPr>
-          <p:cNvPr id="16" name="TextBox 15"/>
-          <p:cNvSpPr txBox="1"/>
-          <p:nvPr/>
-        </p:nvSpPr>
-        <p:spPr>
-          <a:xfrm>
-            <a:off x="228600" y="2895600"/>
-            <a:ext cx="3099823" cy="1200329"/>
-          </a:xfrm>
-          <a:prstGeom prst="rect">
-            <a:avLst/>
-          </a:prstGeom>
-          <a:noFill/>
-        </p:spPr>
-        <p:txBody>
-          <a:bodyPr wrap="none" rtlCol="0">
-            <a:spAutoFit/>
-          </a:bodyPr>
-          <a:lstStyle/>
-          <a:p>
-            <a:r>
-              <a:rPr lang="en-US" dirty="0"/>
-              <a:t>Our p-values is </a:t>
-            </a:r>
-          </a:p>
-          <a:p>
-            <a:r>
-              <a:rPr lang="en-US" dirty="0" err="1"/>
-              <a:t>pbinom</a:t>
-            </a:r>
-            <a:r>
-              <a:rPr lang="en-US" dirty="0"/>
-              <a:t>(0,682,0.75) + </a:t>
-            </a:r>
-          </a:p>
-          <a:p>
-            <a:r>
-              <a:rPr lang="en-US" dirty="0"/>
-              <a:t>everything from the equivalent</a:t>
-            </a:r>
-          </a:p>
-          <a:p>
-            <a:r>
-              <a:rPr lang="en-US" dirty="0"/>
-              <a:t>point on the right…</a:t>
-            </a:r>
-          </a:p>
-        </p:txBody>
-      </p:sp>
-      <p:sp>
-        <p:nvSpPr>
-          <p:cNvPr id="11" name="TextBox 10"/>
-          <p:cNvSpPr txBox="1"/>
-          <p:nvPr/>
-        </p:nvSpPr>
-        <p:spPr>
-          <a:xfrm>
-            <a:off x="92138" y="0"/>
-            <a:ext cx="8975662" cy="369332"/>
-          </a:xfrm>
-          <a:prstGeom prst="rect">
-            <a:avLst/>
-          </a:prstGeom>
-          <a:noFill/>
-        </p:spPr>
-        <p:txBody>
-          <a:bodyPr wrap="none" rtlCol="0">
-            <a:spAutoFit/>
-          </a:bodyPr>
-          <a:lstStyle/>
-          <a:p>
-            <a:r>
-              <a:rPr lang="en-US" dirty="0"/>
-              <a:t>It turns out that </a:t>
-            </a:r>
-            <a:r>
-              <a:rPr lang="en-US" dirty="0" err="1"/>
-              <a:t>binom.test</a:t>
-            </a:r>
-            <a:r>
-              <a:rPr lang="en-US" dirty="0"/>
-              <a:t> is written in R, so we can get to code easily..(type </a:t>
-            </a:r>
-            <a:r>
-              <a:rPr lang="en-US" dirty="0" err="1"/>
-              <a:t>binom.test</a:t>
-            </a:r>
-            <a:r>
-              <a:rPr lang="en-US" dirty="0"/>
-              <a:t> in R )</a:t>
-            </a:r>
-          </a:p>
-        </p:txBody>
-      </p:sp>
-      <p:sp>
-        <p:nvSpPr>
-          <p:cNvPr id="2" name="TextBox 1"/>
-          <p:cNvSpPr txBox="1"/>
-          <p:nvPr/>
-        </p:nvSpPr>
-        <p:spPr>
-          <a:xfrm>
-            <a:off x="228600" y="4059198"/>
-            <a:ext cx="3220112" cy="646331"/>
-          </a:xfrm>
-          <a:prstGeom prst="rect">
-            <a:avLst/>
-          </a:prstGeom>
-          <a:noFill/>
-        </p:spPr>
-        <p:txBody>
-          <a:bodyPr wrap="none" rtlCol="0">
-            <a:spAutoFit/>
-          </a:bodyPr>
-          <a:lstStyle/>
-          <a:p>
-            <a:r>
-              <a:rPr lang="en-US" dirty="0"/>
-              <a:t>This number turns out to be 705</a:t>
-            </a:r>
-          </a:p>
-          <a:p>
-            <a:endParaRPr lang="en-US" dirty="0"/>
-          </a:p>
-        </p:txBody>
-      </p:sp>
-      <p:cxnSp>
-        <p:nvCxnSpPr>
-          <p:cNvPr id="4" name="Straight Arrow Connector 3"/>
-          <p:cNvCxnSpPr/>
-          <p:nvPr/>
-        </p:nvCxnSpPr>
-        <p:spPr>
-          <a:xfrm flipH="1">
-            <a:off x="7504949" y="3505200"/>
-            <a:ext cx="267343" cy="243721"/>
-          </a:xfrm>
-          <a:prstGeom prst="straightConnector1">
-            <a:avLst/>
-          </a:prstGeom>
-          <a:ln>
-            <a:tailEnd type="triangle"/>
-          </a:ln>
-        </p:spPr>
-        <p:style>
-          <a:lnRef idx="1">
-            <a:schemeClr val="accent1"/>
-          </a:lnRef>
-          <a:fillRef idx="0">
-            <a:schemeClr val="accent1"/>
-          </a:fillRef>
-          <a:effectRef idx="0">
-            <a:schemeClr val="accent1"/>
-          </a:effectRef>
-          <a:fontRef idx="minor">
-            <a:schemeClr val="tx1"/>
-          </a:fontRef>
-        </p:style>
-      </p:cxnSp>
     </p:spTree>
   </p:cSld>
   <p:clrMapOvr>

</xml_diff>